<commit_message>
Add documentation for isDerivedFrom shortcut.
</commit_message>
<xml_diff>
--- a/documentation/ontology diagrams.pptx
+++ b/documentation/ontology diagrams.pptx
@@ -7,6 +7,7 @@
   <p:sldIdLst>
     <p:sldId id="257" r:id="rId2"/>
     <p:sldId id="258" r:id="rId3"/>
+    <p:sldId id="260" r:id="rId4"/>
   </p:sldIdLst>
   <p:sldSz cx="12192000" cy="6858000"/>
   <p:notesSz cx="6858000" cy="9144000"/>
@@ -260,7 +261,7 @@
           <a:p>
             <a:fld id="{E3DB725C-C332-4907-9A07-3D5176E01974}" type="datetimeFigureOut">
               <a:rPr lang="en-US" smtClean="0"/>
-              <a:t>8/21/2018</a:t>
+              <a:t>8/27/2018</a:t>
             </a:fld>
             <a:endParaRPr lang="en-US"/>
           </a:p>
@@ -458,7 +459,7 @@
           <a:p>
             <a:fld id="{E3DB725C-C332-4907-9A07-3D5176E01974}" type="datetimeFigureOut">
               <a:rPr lang="en-US" smtClean="0"/>
-              <a:t>8/21/2018</a:t>
+              <a:t>8/27/2018</a:t>
             </a:fld>
             <a:endParaRPr lang="en-US"/>
           </a:p>
@@ -666,7 +667,7 @@
           <a:p>
             <a:fld id="{E3DB725C-C332-4907-9A07-3D5176E01974}" type="datetimeFigureOut">
               <a:rPr lang="en-US" smtClean="0"/>
-              <a:t>8/21/2018</a:t>
+              <a:t>8/27/2018</a:t>
             </a:fld>
             <a:endParaRPr lang="en-US"/>
           </a:p>
@@ -864,7 +865,7 @@
           <a:p>
             <a:fld id="{E3DB725C-C332-4907-9A07-3D5176E01974}" type="datetimeFigureOut">
               <a:rPr lang="en-US" smtClean="0"/>
-              <a:t>8/21/2018</a:t>
+              <a:t>8/27/2018</a:t>
             </a:fld>
             <a:endParaRPr lang="en-US"/>
           </a:p>
@@ -1139,7 +1140,7 @@
           <a:p>
             <a:fld id="{E3DB725C-C332-4907-9A07-3D5176E01974}" type="datetimeFigureOut">
               <a:rPr lang="en-US" smtClean="0"/>
-              <a:t>8/21/2018</a:t>
+              <a:t>8/27/2018</a:t>
             </a:fld>
             <a:endParaRPr lang="en-US"/>
           </a:p>
@@ -1404,7 +1405,7 @@
           <a:p>
             <a:fld id="{E3DB725C-C332-4907-9A07-3D5176E01974}" type="datetimeFigureOut">
               <a:rPr lang="en-US" smtClean="0"/>
-              <a:t>8/21/2018</a:t>
+              <a:t>8/27/2018</a:t>
             </a:fld>
             <a:endParaRPr lang="en-US"/>
           </a:p>
@@ -1816,7 +1817,7 @@
           <a:p>
             <a:fld id="{E3DB725C-C332-4907-9A07-3D5176E01974}" type="datetimeFigureOut">
               <a:rPr lang="en-US" smtClean="0"/>
-              <a:t>8/21/2018</a:t>
+              <a:t>8/27/2018</a:t>
             </a:fld>
             <a:endParaRPr lang="en-US"/>
           </a:p>
@@ -1957,7 +1958,7 @@
           <a:p>
             <a:fld id="{E3DB725C-C332-4907-9A07-3D5176E01974}" type="datetimeFigureOut">
               <a:rPr lang="en-US" smtClean="0"/>
-              <a:t>8/21/2018</a:t>
+              <a:t>8/27/2018</a:t>
             </a:fld>
             <a:endParaRPr lang="en-US"/>
           </a:p>
@@ -2070,7 +2071,7 @@
           <a:p>
             <a:fld id="{E3DB725C-C332-4907-9A07-3D5176E01974}" type="datetimeFigureOut">
               <a:rPr lang="en-US" smtClean="0"/>
-              <a:t>8/21/2018</a:t>
+              <a:t>8/27/2018</a:t>
             </a:fld>
             <a:endParaRPr lang="en-US"/>
           </a:p>
@@ -2381,7 +2382,7 @@
           <a:p>
             <a:fld id="{E3DB725C-C332-4907-9A07-3D5176E01974}" type="datetimeFigureOut">
               <a:rPr lang="en-US" smtClean="0"/>
-              <a:t>8/21/2018</a:t>
+              <a:t>8/27/2018</a:t>
             </a:fld>
             <a:endParaRPr lang="en-US"/>
           </a:p>
@@ -2669,7 +2670,7 @@
           <a:p>
             <a:fld id="{E3DB725C-C332-4907-9A07-3D5176E01974}" type="datetimeFigureOut">
               <a:rPr lang="en-US" smtClean="0"/>
-              <a:t>8/21/2018</a:t>
+              <a:t>8/27/2018</a:t>
             </a:fld>
             <a:endParaRPr lang="en-US"/>
           </a:p>
@@ -2910,7 +2911,7 @@
           <a:p>
             <a:fld id="{E3DB725C-C332-4907-9A07-3D5176E01974}" type="datetimeFigureOut">
               <a:rPr lang="en-US" smtClean="0"/>
-              <a:t>8/21/2018</a:t>
+              <a:t>8/27/2018</a:t>
             </a:fld>
             <a:endParaRPr lang="en-US"/>
           </a:p>
@@ -5869,6 +5870,1235 @@
 </p:sld>
 </file>
 
+<file path=ppt/slides/slide3.xml><?xml version="1.0" encoding="utf-8"?>
+<p:sld xmlns:a="http://schemas.openxmlformats.org/drawingml/2006/main" xmlns:r="http://schemas.openxmlformats.org/officeDocument/2006/relationships" xmlns:p="http://schemas.openxmlformats.org/presentationml/2006/main">
+  <p:cSld>
+    <p:spTree>
+      <p:nvGrpSpPr>
+        <p:cNvPr id="1" name=""/>
+        <p:cNvGrpSpPr/>
+        <p:nvPr/>
+      </p:nvGrpSpPr>
+      <p:grpSpPr>
+        <a:xfrm>
+          <a:off x="0" y="0"/>
+          <a:ext cx="0" cy="0"/>
+          <a:chOff x="0" y="0"/>
+          <a:chExt cx="0" cy="0"/>
+        </a:xfrm>
+      </p:grpSpPr>
+      <p:sp>
+        <p:nvSpPr>
+          <p:cNvPr id="2" name="Title 1">
+            <a:extLst>
+              <a:ext uri="{FF2B5EF4-FFF2-40B4-BE49-F238E27FC236}">
+                <a16:creationId xmlns:a16="http://schemas.microsoft.com/office/drawing/2014/main" id="{91ED9657-895B-491A-9323-8DD9578F8F39}"/>
+              </a:ext>
+            </a:extLst>
+          </p:cNvPr>
+          <p:cNvSpPr>
+            <a:spLocks noGrp="1"/>
+          </p:cNvSpPr>
+          <p:nvPr>
+            <p:ph type="title"/>
+          </p:nvPr>
+        </p:nvSpPr>
+        <p:spPr/>
+        <p:txBody>
+          <a:bodyPr/>
+          <a:lstStyle/>
+          <a:p>
+            <a:r>
+              <a:rPr lang="en-US" dirty="0"/>
+              <a:t>Taxonomic hierarchy vs role hierarchy</a:t>
+            </a:r>
+          </a:p>
+        </p:txBody>
+      </p:sp>
+      <p:sp>
+        <p:nvSpPr>
+          <p:cNvPr id="4" name="Oval 3">
+            <a:extLst>
+              <a:ext uri="{FF2B5EF4-FFF2-40B4-BE49-F238E27FC236}">
+                <a16:creationId xmlns:a16="http://schemas.microsoft.com/office/drawing/2014/main" id="{3214CC39-6A93-4E3A-ABD1-A36399890915}"/>
+              </a:ext>
+            </a:extLst>
+          </p:cNvPr>
+          <p:cNvSpPr/>
+          <p:nvPr/>
+        </p:nvSpPr>
+        <p:spPr>
+          <a:xfrm>
+            <a:off x="1617160" y="2185766"/>
+            <a:ext cx="1828800" cy="711843"/>
+          </a:xfrm>
+          <a:prstGeom prst="ellipse">
+            <a:avLst/>
+          </a:prstGeom>
+          <a:noFill/>
+        </p:spPr>
+        <p:style>
+          <a:lnRef idx="2">
+            <a:schemeClr val="accent1">
+              <a:shade val="50000"/>
+            </a:schemeClr>
+          </a:lnRef>
+          <a:fillRef idx="1">
+            <a:schemeClr val="accent1"/>
+          </a:fillRef>
+          <a:effectRef idx="0">
+            <a:schemeClr val="accent1"/>
+          </a:effectRef>
+          <a:fontRef idx="minor">
+            <a:schemeClr val="lt1"/>
+          </a:fontRef>
+        </p:style>
+        <p:txBody>
+          <a:bodyPr rtlCol="0" anchor="ctr"/>
+          <a:lstStyle/>
+          <a:p>
+            <a:pPr algn="ctr"/>
+            <a:endParaRPr lang="en-US" dirty="0"/>
+          </a:p>
+        </p:txBody>
+      </p:sp>
+      <p:sp>
+        <p:nvSpPr>
+          <p:cNvPr id="5" name="Oval 4">
+            <a:extLst>
+              <a:ext uri="{FF2B5EF4-FFF2-40B4-BE49-F238E27FC236}">
+                <a16:creationId xmlns:a16="http://schemas.microsoft.com/office/drawing/2014/main" id="{BC17B2F8-B43E-4DE5-980E-805B95FE88B9}"/>
+              </a:ext>
+            </a:extLst>
+          </p:cNvPr>
+          <p:cNvSpPr/>
+          <p:nvPr/>
+        </p:nvSpPr>
+        <p:spPr>
+          <a:xfrm>
+            <a:off x="899610" y="3620866"/>
+            <a:ext cx="1828800" cy="711843"/>
+          </a:xfrm>
+          <a:prstGeom prst="ellipse">
+            <a:avLst/>
+          </a:prstGeom>
+          <a:noFill/>
+        </p:spPr>
+        <p:style>
+          <a:lnRef idx="2">
+            <a:schemeClr val="accent1">
+              <a:shade val="50000"/>
+            </a:schemeClr>
+          </a:lnRef>
+          <a:fillRef idx="1">
+            <a:schemeClr val="accent1"/>
+          </a:fillRef>
+          <a:effectRef idx="0">
+            <a:schemeClr val="accent1"/>
+          </a:effectRef>
+          <a:fontRef idx="minor">
+            <a:schemeClr val="lt1"/>
+          </a:fontRef>
+        </p:style>
+        <p:txBody>
+          <a:bodyPr rtlCol="0" anchor="ctr"/>
+          <a:lstStyle/>
+          <a:p>
+            <a:pPr algn="ctr"/>
+            <a:endParaRPr lang="en-US" dirty="0"/>
+          </a:p>
+        </p:txBody>
+      </p:sp>
+      <p:sp>
+        <p:nvSpPr>
+          <p:cNvPr id="6" name="Rectangle 5">
+            <a:extLst>
+              <a:ext uri="{FF2B5EF4-FFF2-40B4-BE49-F238E27FC236}">
+                <a16:creationId xmlns:a16="http://schemas.microsoft.com/office/drawing/2014/main" id="{08D07C1C-EA09-4FB8-BF3C-ADFC19F3A2EF}"/>
+              </a:ext>
+            </a:extLst>
+          </p:cNvPr>
+          <p:cNvSpPr/>
+          <p:nvPr/>
+        </p:nvSpPr>
+        <p:spPr>
+          <a:xfrm>
+            <a:off x="3445960" y="3620866"/>
+            <a:ext cx="1869312" cy="682906"/>
+          </a:xfrm>
+          <a:prstGeom prst="rect">
+            <a:avLst/>
+          </a:prstGeom>
+          <a:noFill/>
+        </p:spPr>
+        <p:style>
+          <a:lnRef idx="2">
+            <a:schemeClr val="accent1">
+              <a:shade val="50000"/>
+            </a:schemeClr>
+          </a:lnRef>
+          <a:fillRef idx="1">
+            <a:schemeClr val="accent1"/>
+          </a:fillRef>
+          <a:effectRef idx="0">
+            <a:schemeClr val="accent1"/>
+          </a:effectRef>
+          <a:fontRef idx="minor">
+            <a:schemeClr val="lt1"/>
+          </a:fontRef>
+        </p:style>
+        <p:txBody>
+          <a:bodyPr rtlCol="0" anchor="ctr"/>
+          <a:lstStyle/>
+          <a:p>
+            <a:pPr algn="ctr"/>
+            <a:endParaRPr lang="en-US" dirty="0"/>
+          </a:p>
+        </p:txBody>
+      </p:sp>
+      <p:sp>
+        <p:nvSpPr>
+          <p:cNvPr id="7" name="Rectangle 6">
+            <a:extLst>
+              <a:ext uri="{FF2B5EF4-FFF2-40B4-BE49-F238E27FC236}">
+                <a16:creationId xmlns:a16="http://schemas.microsoft.com/office/drawing/2014/main" id="{F0B8B9B0-6EFE-4D80-934A-138BDA309853}"/>
+              </a:ext>
+            </a:extLst>
+          </p:cNvPr>
+          <p:cNvSpPr/>
+          <p:nvPr/>
+        </p:nvSpPr>
+        <p:spPr>
+          <a:xfrm>
+            <a:off x="838200" y="5206920"/>
+            <a:ext cx="1869312" cy="682906"/>
+          </a:xfrm>
+          <a:prstGeom prst="rect">
+            <a:avLst/>
+          </a:prstGeom>
+          <a:noFill/>
+        </p:spPr>
+        <p:style>
+          <a:lnRef idx="2">
+            <a:schemeClr val="accent1">
+              <a:shade val="50000"/>
+            </a:schemeClr>
+          </a:lnRef>
+          <a:fillRef idx="1">
+            <a:schemeClr val="accent1"/>
+          </a:fillRef>
+          <a:effectRef idx="0">
+            <a:schemeClr val="accent1"/>
+          </a:effectRef>
+          <a:fontRef idx="minor">
+            <a:schemeClr val="lt1"/>
+          </a:fontRef>
+        </p:style>
+        <p:txBody>
+          <a:bodyPr rtlCol="0" anchor="ctr"/>
+          <a:lstStyle/>
+          <a:p>
+            <a:pPr algn="ctr"/>
+            <a:endParaRPr lang="en-US" dirty="0"/>
+          </a:p>
+        </p:txBody>
+      </p:sp>
+      <p:sp>
+        <p:nvSpPr>
+          <p:cNvPr id="8" name="Rectangle 7">
+            <a:extLst>
+              <a:ext uri="{FF2B5EF4-FFF2-40B4-BE49-F238E27FC236}">
+                <a16:creationId xmlns:a16="http://schemas.microsoft.com/office/drawing/2014/main" id="{E815E9B4-4C5B-4EA4-81B4-495E2A7A5EC1}"/>
+              </a:ext>
+            </a:extLst>
+          </p:cNvPr>
+          <p:cNvSpPr/>
+          <p:nvPr/>
+        </p:nvSpPr>
+        <p:spPr>
+          <a:xfrm>
+            <a:off x="6698367" y="3620866"/>
+            <a:ext cx="1869312" cy="682906"/>
+          </a:xfrm>
+          <a:prstGeom prst="rect">
+            <a:avLst/>
+          </a:prstGeom>
+          <a:noFill/>
+        </p:spPr>
+        <p:style>
+          <a:lnRef idx="2">
+            <a:schemeClr val="accent1">
+              <a:shade val="50000"/>
+            </a:schemeClr>
+          </a:lnRef>
+          <a:fillRef idx="1">
+            <a:schemeClr val="accent1"/>
+          </a:fillRef>
+          <a:effectRef idx="0">
+            <a:schemeClr val="accent1"/>
+          </a:effectRef>
+          <a:fontRef idx="minor">
+            <a:schemeClr val="lt1"/>
+          </a:fontRef>
+        </p:style>
+        <p:txBody>
+          <a:bodyPr rtlCol="0" anchor="ctr"/>
+          <a:lstStyle/>
+          <a:p>
+            <a:pPr algn="ctr"/>
+            <a:endParaRPr lang="en-US" dirty="0"/>
+          </a:p>
+        </p:txBody>
+      </p:sp>
+      <p:sp>
+        <p:nvSpPr>
+          <p:cNvPr id="9" name="Rectangle 8">
+            <a:extLst>
+              <a:ext uri="{FF2B5EF4-FFF2-40B4-BE49-F238E27FC236}">
+                <a16:creationId xmlns:a16="http://schemas.microsoft.com/office/drawing/2014/main" id="{C75366D7-8862-4E77-B501-0F624E3F1E66}"/>
+              </a:ext>
+            </a:extLst>
+          </p:cNvPr>
+          <p:cNvSpPr/>
+          <p:nvPr/>
+        </p:nvSpPr>
+        <p:spPr>
+          <a:xfrm>
+            <a:off x="10012743" y="3620866"/>
+            <a:ext cx="1874456" cy="682906"/>
+          </a:xfrm>
+          <a:prstGeom prst="rect">
+            <a:avLst/>
+          </a:prstGeom>
+          <a:noFill/>
+        </p:spPr>
+        <p:style>
+          <a:lnRef idx="2">
+            <a:schemeClr val="accent1">
+              <a:shade val="50000"/>
+            </a:schemeClr>
+          </a:lnRef>
+          <a:fillRef idx="1">
+            <a:schemeClr val="accent1"/>
+          </a:fillRef>
+          <a:effectRef idx="0">
+            <a:schemeClr val="accent1"/>
+          </a:effectRef>
+          <a:fontRef idx="minor">
+            <a:schemeClr val="lt1"/>
+          </a:fontRef>
+        </p:style>
+        <p:txBody>
+          <a:bodyPr rtlCol="0" anchor="ctr"/>
+          <a:lstStyle/>
+          <a:p>
+            <a:pPr algn="ctr"/>
+            <a:endParaRPr lang="en-US" dirty="0"/>
+          </a:p>
+        </p:txBody>
+      </p:sp>
+      <p:sp>
+        <p:nvSpPr>
+          <p:cNvPr id="10" name="Oval 9">
+            <a:extLst>
+              <a:ext uri="{FF2B5EF4-FFF2-40B4-BE49-F238E27FC236}">
+                <a16:creationId xmlns:a16="http://schemas.microsoft.com/office/drawing/2014/main" id="{05FCF5CA-5EF1-4BFA-B930-DBCBB667EECE}"/>
+              </a:ext>
+            </a:extLst>
+          </p:cNvPr>
+          <p:cNvSpPr/>
+          <p:nvPr/>
+        </p:nvSpPr>
+        <p:spPr>
+          <a:xfrm>
+            <a:off x="8392610" y="2185766"/>
+            <a:ext cx="1828800" cy="711843"/>
+          </a:xfrm>
+          <a:prstGeom prst="ellipse">
+            <a:avLst/>
+          </a:prstGeom>
+          <a:noFill/>
+        </p:spPr>
+        <p:style>
+          <a:lnRef idx="2">
+            <a:schemeClr val="accent1">
+              <a:shade val="50000"/>
+            </a:schemeClr>
+          </a:lnRef>
+          <a:fillRef idx="1">
+            <a:schemeClr val="accent1"/>
+          </a:fillRef>
+          <a:effectRef idx="0">
+            <a:schemeClr val="accent1"/>
+          </a:effectRef>
+          <a:fontRef idx="minor">
+            <a:schemeClr val="lt1"/>
+          </a:fontRef>
+        </p:style>
+        <p:txBody>
+          <a:bodyPr rtlCol="0" anchor="ctr"/>
+          <a:lstStyle/>
+          <a:p>
+            <a:pPr algn="ctr"/>
+            <a:endParaRPr lang="en-US" dirty="0"/>
+          </a:p>
+        </p:txBody>
+      </p:sp>
+      <p:sp>
+        <p:nvSpPr>
+          <p:cNvPr id="11" name="Arrow: Right 10">
+            <a:extLst>
+              <a:ext uri="{FF2B5EF4-FFF2-40B4-BE49-F238E27FC236}">
+                <a16:creationId xmlns:a16="http://schemas.microsoft.com/office/drawing/2014/main" id="{F88F8DE6-0D69-4888-AA4A-558849AFA30B}"/>
+              </a:ext>
+            </a:extLst>
+          </p:cNvPr>
+          <p:cNvSpPr/>
+          <p:nvPr/>
+        </p:nvSpPr>
+        <p:spPr>
+          <a:xfrm rot="18473909" flipV="1">
+            <a:off x="1781144" y="3124505"/>
+            <a:ext cx="895851" cy="246164"/>
+          </a:xfrm>
+          <a:prstGeom prst="rightArrow">
+            <a:avLst>
+              <a:gd name="adj1" fmla="val 0"/>
+              <a:gd name="adj2" fmla="val 94727"/>
+            </a:avLst>
+          </a:prstGeom>
+          <a:noFill/>
+          <a:ln w="9525"/>
+        </p:spPr>
+        <p:style>
+          <a:lnRef idx="2">
+            <a:schemeClr val="accent1">
+              <a:shade val="50000"/>
+            </a:schemeClr>
+          </a:lnRef>
+          <a:fillRef idx="1">
+            <a:schemeClr val="accent1"/>
+          </a:fillRef>
+          <a:effectRef idx="0">
+            <a:schemeClr val="accent1"/>
+          </a:effectRef>
+          <a:fontRef idx="minor">
+            <a:schemeClr val="lt1"/>
+          </a:fontRef>
+        </p:style>
+        <p:txBody>
+          <a:bodyPr rtlCol="0" anchor="ctr"/>
+          <a:lstStyle/>
+          <a:p>
+            <a:pPr algn="ctr"/>
+            <a:endParaRPr lang="en-US" dirty="0"/>
+          </a:p>
+        </p:txBody>
+      </p:sp>
+      <p:sp>
+        <p:nvSpPr>
+          <p:cNvPr id="12" name="Arrow: Right 11">
+            <a:extLst>
+              <a:ext uri="{FF2B5EF4-FFF2-40B4-BE49-F238E27FC236}">
+                <a16:creationId xmlns:a16="http://schemas.microsoft.com/office/drawing/2014/main" id="{EE694D19-D9B5-4447-95EA-5E5FADC611FC}"/>
+              </a:ext>
+            </a:extLst>
+          </p:cNvPr>
+          <p:cNvSpPr/>
+          <p:nvPr/>
+        </p:nvSpPr>
+        <p:spPr>
+          <a:xfrm rot="17689808" flipV="1">
+            <a:off x="1181594" y="4631465"/>
+            <a:ext cx="884403" cy="245267"/>
+          </a:xfrm>
+          <a:prstGeom prst="rightArrow">
+            <a:avLst>
+              <a:gd name="adj1" fmla="val 0"/>
+              <a:gd name="adj2" fmla="val 94727"/>
+            </a:avLst>
+          </a:prstGeom>
+          <a:pattFill prst="pct25">
+            <a:fgClr>
+              <a:schemeClr val="accent1"/>
+            </a:fgClr>
+            <a:bgClr>
+              <a:schemeClr val="bg1"/>
+            </a:bgClr>
+          </a:pattFill>
+          <a:ln w="9525"/>
+        </p:spPr>
+        <p:style>
+          <a:lnRef idx="2">
+            <a:schemeClr val="accent1">
+              <a:shade val="50000"/>
+            </a:schemeClr>
+          </a:lnRef>
+          <a:fillRef idx="1">
+            <a:schemeClr val="accent1"/>
+          </a:fillRef>
+          <a:effectRef idx="0">
+            <a:schemeClr val="accent1"/>
+          </a:effectRef>
+          <a:fontRef idx="minor">
+            <a:schemeClr val="lt1"/>
+          </a:fontRef>
+        </p:style>
+        <p:txBody>
+          <a:bodyPr rtlCol="0" anchor="ctr"/>
+          <a:lstStyle/>
+          <a:p>
+            <a:pPr algn="ctr"/>
+            <a:endParaRPr lang="en-US" dirty="0"/>
+          </a:p>
+        </p:txBody>
+      </p:sp>
+      <p:sp>
+        <p:nvSpPr>
+          <p:cNvPr id="13" name="Arrow: Right 12">
+            <a:extLst>
+              <a:ext uri="{FF2B5EF4-FFF2-40B4-BE49-F238E27FC236}">
+                <a16:creationId xmlns:a16="http://schemas.microsoft.com/office/drawing/2014/main" id="{FB14AB95-B375-4895-B25C-9C3130F00005}"/>
+              </a:ext>
+            </a:extLst>
+          </p:cNvPr>
+          <p:cNvSpPr/>
+          <p:nvPr/>
+        </p:nvSpPr>
+        <p:spPr>
+          <a:xfrm rot="12675073" flipV="1">
+            <a:off x="2806030" y="3096757"/>
+            <a:ext cx="1392429" cy="254712"/>
+          </a:xfrm>
+          <a:prstGeom prst="rightArrow">
+            <a:avLst>
+              <a:gd name="adj1" fmla="val 0"/>
+              <a:gd name="adj2" fmla="val 94727"/>
+            </a:avLst>
+          </a:prstGeom>
+          <a:pattFill prst="pct25">
+            <a:fgClr>
+              <a:schemeClr val="accent1"/>
+            </a:fgClr>
+            <a:bgClr>
+              <a:schemeClr val="bg1"/>
+            </a:bgClr>
+          </a:pattFill>
+          <a:ln w="9525"/>
+        </p:spPr>
+        <p:style>
+          <a:lnRef idx="2">
+            <a:schemeClr val="accent1">
+              <a:shade val="50000"/>
+            </a:schemeClr>
+          </a:lnRef>
+          <a:fillRef idx="1">
+            <a:schemeClr val="accent1"/>
+          </a:fillRef>
+          <a:effectRef idx="0">
+            <a:schemeClr val="accent1"/>
+          </a:effectRef>
+          <a:fontRef idx="minor">
+            <a:schemeClr val="lt1"/>
+          </a:fontRef>
+        </p:style>
+        <p:txBody>
+          <a:bodyPr rtlCol="0" anchor="ctr"/>
+          <a:lstStyle/>
+          <a:p>
+            <a:pPr algn="ctr"/>
+            <a:endParaRPr lang="en-US" dirty="0"/>
+          </a:p>
+        </p:txBody>
+      </p:sp>
+      <p:sp>
+        <p:nvSpPr>
+          <p:cNvPr id="14" name="Arrow: Right 13">
+            <a:extLst>
+              <a:ext uri="{FF2B5EF4-FFF2-40B4-BE49-F238E27FC236}">
+                <a16:creationId xmlns:a16="http://schemas.microsoft.com/office/drawing/2014/main" id="{916AC1A0-0B7F-4452-AE9F-75FD94C27CC3}"/>
+              </a:ext>
+            </a:extLst>
+          </p:cNvPr>
+          <p:cNvSpPr/>
+          <p:nvPr/>
+        </p:nvSpPr>
+        <p:spPr>
+          <a:xfrm rot="13431729" flipV="1">
+            <a:off x="9867253" y="3040168"/>
+            <a:ext cx="1172020" cy="288146"/>
+          </a:xfrm>
+          <a:prstGeom prst="rightArrow">
+            <a:avLst>
+              <a:gd name="adj1" fmla="val 0"/>
+              <a:gd name="adj2" fmla="val 94727"/>
+            </a:avLst>
+          </a:prstGeom>
+          <a:pattFill prst="pct25">
+            <a:fgClr>
+              <a:schemeClr val="accent1"/>
+            </a:fgClr>
+            <a:bgClr>
+              <a:schemeClr val="bg1"/>
+            </a:bgClr>
+          </a:pattFill>
+          <a:ln w="9525"/>
+        </p:spPr>
+        <p:style>
+          <a:lnRef idx="2">
+            <a:schemeClr val="accent1">
+              <a:shade val="50000"/>
+            </a:schemeClr>
+          </a:lnRef>
+          <a:fillRef idx="1">
+            <a:schemeClr val="accent1"/>
+          </a:fillRef>
+          <a:effectRef idx="0">
+            <a:schemeClr val="accent1"/>
+          </a:effectRef>
+          <a:fontRef idx="minor">
+            <a:schemeClr val="lt1"/>
+          </a:fontRef>
+        </p:style>
+        <p:txBody>
+          <a:bodyPr rtlCol="0" anchor="ctr"/>
+          <a:lstStyle/>
+          <a:p>
+            <a:pPr algn="ctr"/>
+            <a:endParaRPr lang="en-US" dirty="0"/>
+          </a:p>
+        </p:txBody>
+      </p:sp>
+      <p:sp>
+        <p:nvSpPr>
+          <p:cNvPr id="15" name="Arrow: Right 14">
+            <a:extLst>
+              <a:ext uri="{FF2B5EF4-FFF2-40B4-BE49-F238E27FC236}">
+                <a16:creationId xmlns:a16="http://schemas.microsoft.com/office/drawing/2014/main" id="{43CC574E-A81B-480C-80D5-B85C025BF4EB}"/>
+              </a:ext>
+            </a:extLst>
+          </p:cNvPr>
+          <p:cNvSpPr/>
+          <p:nvPr/>
+        </p:nvSpPr>
+        <p:spPr>
+          <a:xfrm rot="17689808" flipV="1">
+            <a:off x="7926242" y="3029994"/>
+            <a:ext cx="898715" cy="276129"/>
+          </a:xfrm>
+          <a:prstGeom prst="rightArrow">
+            <a:avLst>
+              <a:gd name="adj1" fmla="val 0"/>
+              <a:gd name="adj2" fmla="val 94727"/>
+            </a:avLst>
+          </a:prstGeom>
+          <a:pattFill prst="pct25">
+            <a:fgClr>
+              <a:schemeClr val="accent1"/>
+            </a:fgClr>
+            <a:bgClr>
+              <a:schemeClr val="bg1"/>
+            </a:bgClr>
+          </a:pattFill>
+          <a:ln w="9525"/>
+        </p:spPr>
+        <p:style>
+          <a:lnRef idx="2">
+            <a:schemeClr val="accent1">
+              <a:shade val="50000"/>
+            </a:schemeClr>
+          </a:lnRef>
+          <a:fillRef idx="1">
+            <a:schemeClr val="accent1"/>
+          </a:fillRef>
+          <a:effectRef idx="0">
+            <a:schemeClr val="accent1"/>
+          </a:effectRef>
+          <a:fontRef idx="minor">
+            <a:schemeClr val="lt1"/>
+          </a:fontRef>
+        </p:style>
+        <p:txBody>
+          <a:bodyPr rtlCol="0" anchor="ctr"/>
+          <a:lstStyle/>
+          <a:p>
+            <a:pPr algn="ctr"/>
+            <a:endParaRPr lang="en-US" dirty="0"/>
+          </a:p>
+        </p:txBody>
+      </p:sp>
+      <p:cxnSp>
+        <p:nvCxnSpPr>
+          <p:cNvPr id="16" name="Straight Arrow Connector 15">
+            <a:extLst>
+              <a:ext uri="{FF2B5EF4-FFF2-40B4-BE49-F238E27FC236}">
+                <a16:creationId xmlns:a16="http://schemas.microsoft.com/office/drawing/2014/main" id="{EAE97A70-C5B9-45EF-A919-E2BC49EF2845}"/>
+              </a:ext>
+            </a:extLst>
+          </p:cNvPr>
+          <p:cNvCxnSpPr>
+            <a:cxnSpLocks/>
+            <a:stCxn id="8" idx="3"/>
+            <a:endCxn id="9" idx="1"/>
+          </p:cNvCxnSpPr>
+          <p:nvPr/>
+        </p:nvCxnSpPr>
+        <p:spPr>
+          <a:xfrm>
+            <a:off x="8567679" y="3962319"/>
+            <a:ext cx="1445064" cy="0"/>
+          </a:xfrm>
+          <a:prstGeom prst="straightConnector1">
+            <a:avLst/>
+          </a:prstGeom>
+          <a:ln>
+            <a:tailEnd type="triangle" w="lg" len="lg"/>
+          </a:ln>
+        </p:spPr>
+        <p:style>
+          <a:lnRef idx="1">
+            <a:schemeClr val="accent1"/>
+          </a:lnRef>
+          <a:fillRef idx="0">
+            <a:schemeClr val="accent1"/>
+          </a:fillRef>
+          <a:effectRef idx="0">
+            <a:schemeClr val="accent1"/>
+          </a:effectRef>
+          <a:fontRef idx="minor">
+            <a:schemeClr val="tx1"/>
+          </a:fontRef>
+        </p:style>
+      </p:cxnSp>
+      <p:sp>
+        <p:nvSpPr>
+          <p:cNvPr id="19" name="TextBox 18">
+            <a:extLst>
+              <a:ext uri="{FF2B5EF4-FFF2-40B4-BE49-F238E27FC236}">
+                <a16:creationId xmlns:a16="http://schemas.microsoft.com/office/drawing/2014/main" id="{449660C6-13B3-4906-B7CE-A620D45A06E6}"/>
+              </a:ext>
+            </a:extLst>
+          </p:cNvPr>
+          <p:cNvSpPr txBox="1"/>
+          <p:nvPr/>
+        </p:nvSpPr>
+        <p:spPr>
+          <a:xfrm>
+            <a:off x="2406650" y="2286000"/>
+            <a:ext cx="300862" cy="369332"/>
+          </a:xfrm>
+          <a:prstGeom prst="rect">
+            <a:avLst/>
+          </a:prstGeom>
+          <a:noFill/>
+        </p:spPr>
+        <p:txBody>
+          <a:bodyPr wrap="square" rtlCol="0">
+            <a:spAutoFit/>
+          </a:bodyPr>
+          <a:lstStyle/>
+          <a:p>
+            <a:r>
+              <a:rPr lang="en-US" dirty="0"/>
+              <a:t>A</a:t>
+            </a:r>
+          </a:p>
+        </p:txBody>
+      </p:sp>
+      <p:sp>
+        <p:nvSpPr>
+          <p:cNvPr id="20" name="TextBox 19">
+            <a:extLst>
+              <a:ext uri="{FF2B5EF4-FFF2-40B4-BE49-F238E27FC236}">
+                <a16:creationId xmlns:a16="http://schemas.microsoft.com/office/drawing/2014/main" id="{94A6FDDA-CECB-46AA-BDE6-45D2A1792C3B}"/>
+              </a:ext>
+            </a:extLst>
+          </p:cNvPr>
+          <p:cNvSpPr txBox="1"/>
+          <p:nvPr/>
+        </p:nvSpPr>
+        <p:spPr>
+          <a:xfrm>
+            <a:off x="1663579" y="3778906"/>
+            <a:ext cx="300862" cy="369332"/>
+          </a:xfrm>
+          <a:prstGeom prst="rect">
+            <a:avLst/>
+          </a:prstGeom>
+          <a:noFill/>
+        </p:spPr>
+        <p:txBody>
+          <a:bodyPr wrap="square" rtlCol="0">
+            <a:spAutoFit/>
+          </a:bodyPr>
+          <a:lstStyle/>
+          <a:p>
+            <a:r>
+              <a:rPr lang="en-US" dirty="0"/>
+              <a:t>B</a:t>
+            </a:r>
+          </a:p>
+        </p:txBody>
+      </p:sp>
+      <p:sp>
+        <p:nvSpPr>
+          <p:cNvPr id="21" name="TextBox 20">
+            <a:extLst>
+              <a:ext uri="{FF2B5EF4-FFF2-40B4-BE49-F238E27FC236}">
+                <a16:creationId xmlns:a16="http://schemas.microsoft.com/office/drawing/2014/main" id="{5B9543DF-67F5-456E-9A36-4C554B78CA05}"/>
+              </a:ext>
+            </a:extLst>
+          </p:cNvPr>
+          <p:cNvSpPr txBox="1"/>
+          <p:nvPr/>
+        </p:nvSpPr>
+        <p:spPr>
+          <a:xfrm>
+            <a:off x="1617160" y="5363707"/>
+            <a:ext cx="300862" cy="369332"/>
+          </a:xfrm>
+          <a:prstGeom prst="rect">
+            <a:avLst/>
+          </a:prstGeom>
+          <a:noFill/>
+        </p:spPr>
+        <p:txBody>
+          <a:bodyPr wrap="square" rtlCol="0">
+            <a:spAutoFit/>
+          </a:bodyPr>
+          <a:lstStyle/>
+          <a:p>
+            <a:r>
+              <a:rPr lang="en-US" dirty="0"/>
+              <a:t>C</a:t>
+            </a:r>
+          </a:p>
+        </p:txBody>
+      </p:sp>
+      <p:sp>
+        <p:nvSpPr>
+          <p:cNvPr id="22" name="TextBox 21">
+            <a:extLst>
+              <a:ext uri="{FF2B5EF4-FFF2-40B4-BE49-F238E27FC236}">
+                <a16:creationId xmlns:a16="http://schemas.microsoft.com/office/drawing/2014/main" id="{5E47BEC5-E99F-4208-BE8C-DD837D4CDF25}"/>
+              </a:ext>
+            </a:extLst>
+          </p:cNvPr>
+          <p:cNvSpPr txBox="1"/>
+          <p:nvPr/>
+        </p:nvSpPr>
+        <p:spPr>
+          <a:xfrm>
+            <a:off x="4169417" y="3777653"/>
+            <a:ext cx="300862" cy="369332"/>
+          </a:xfrm>
+          <a:prstGeom prst="rect">
+            <a:avLst/>
+          </a:prstGeom>
+          <a:noFill/>
+        </p:spPr>
+        <p:txBody>
+          <a:bodyPr wrap="square" rtlCol="0">
+            <a:spAutoFit/>
+          </a:bodyPr>
+          <a:lstStyle/>
+          <a:p>
+            <a:r>
+              <a:rPr lang="en-US" dirty="0"/>
+              <a:t>B</a:t>
+            </a:r>
+          </a:p>
+        </p:txBody>
+      </p:sp>
+      <p:cxnSp>
+        <p:nvCxnSpPr>
+          <p:cNvPr id="24" name="Straight Connector 23">
+            <a:extLst>
+              <a:ext uri="{FF2B5EF4-FFF2-40B4-BE49-F238E27FC236}">
+                <a16:creationId xmlns:a16="http://schemas.microsoft.com/office/drawing/2014/main" id="{BBBE5F36-65AB-425F-B87A-50D0E49B5EA5}"/>
+              </a:ext>
+            </a:extLst>
+          </p:cNvPr>
+          <p:cNvCxnSpPr>
+            <a:stCxn id="7" idx="3"/>
+            <a:endCxn id="6" idx="2"/>
+          </p:cNvCxnSpPr>
+          <p:nvPr/>
+        </p:nvCxnSpPr>
+        <p:spPr>
+          <a:xfrm flipV="1">
+            <a:off x="2707512" y="4303772"/>
+            <a:ext cx="1673104" cy="1244601"/>
+          </a:xfrm>
+          <a:prstGeom prst="line">
+            <a:avLst/>
+          </a:prstGeom>
+          <a:ln>
+            <a:prstDash val="lgDashDot"/>
+          </a:ln>
+        </p:spPr>
+        <p:style>
+          <a:lnRef idx="1">
+            <a:schemeClr val="accent2"/>
+          </a:lnRef>
+          <a:fillRef idx="0">
+            <a:schemeClr val="accent2"/>
+          </a:fillRef>
+          <a:effectRef idx="0">
+            <a:schemeClr val="accent2"/>
+          </a:effectRef>
+          <a:fontRef idx="minor">
+            <a:schemeClr val="tx1"/>
+          </a:fontRef>
+        </p:style>
+      </p:cxnSp>
+      <p:sp>
+        <p:nvSpPr>
+          <p:cNvPr id="26" name="TextBox 25">
+            <a:extLst>
+              <a:ext uri="{FF2B5EF4-FFF2-40B4-BE49-F238E27FC236}">
+                <a16:creationId xmlns:a16="http://schemas.microsoft.com/office/drawing/2014/main" id="{3A58E709-9493-493C-948F-BA3A526B0CCE}"/>
+              </a:ext>
+            </a:extLst>
+          </p:cNvPr>
+          <p:cNvSpPr txBox="1"/>
+          <p:nvPr/>
+        </p:nvSpPr>
+        <p:spPr>
+          <a:xfrm>
+            <a:off x="9156579" y="2350732"/>
+            <a:ext cx="300862" cy="369332"/>
+          </a:xfrm>
+          <a:prstGeom prst="rect">
+            <a:avLst/>
+          </a:prstGeom>
+          <a:noFill/>
+        </p:spPr>
+        <p:txBody>
+          <a:bodyPr wrap="square" rtlCol="0">
+            <a:spAutoFit/>
+          </a:bodyPr>
+          <a:lstStyle/>
+          <a:p>
+            <a:r>
+              <a:rPr lang="en-US" dirty="0"/>
+              <a:t>A</a:t>
+            </a:r>
+          </a:p>
+        </p:txBody>
+      </p:sp>
+      <p:sp>
+        <p:nvSpPr>
+          <p:cNvPr id="27" name="TextBox 26">
+            <a:extLst>
+              <a:ext uri="{FF2B5EF4-FFF2-40B4-BE49-F238E27FC236}">
+                <a16:creationId xmlns:a16="http://schemas.microsoft.com/office/drawing/2014/main" id="{E71A7936-0C32-49A0-AF23-FBDE3839C7C4}"/>
+              </a:ext>
+            </a:extLst>
+          </p:cNvPr>
+          <p:cNvSpPr txBox="1"/>
+          <p:nvPr/>
+        </p:nvSpPr>
+        <p:spPr>
+          <a:xfrm>
+            <a:off x="10821283" y="3772113"/>
+            <a:ext cx="300862" cy="369332"/>
+          </a:xfrm>
+          <a:prstGeom prst="rect">
+            <a:avLst/>
+          </a:prstGeom>
+          <a:noFill/>
+        </p:spPr>
+        <p:txBody>
+          <a:bodyPr wrap="square" rtlCol="0">
+            <a:spAutoFit/>
+          </a:bodyPr>
+          <a:lstStyle/>
+          <a:p>
+            <a:r>
+              <a:rPr lang="en-US" dirty="0"/>
+              <a:t>B</a:t>
+            </a:r>
+          </a:p>
+        </p:txBody>
+      </p:sp>
+      <p:sp>
+        <p:nvSpPr>
+          <p:cNvPr id="28" name="TextBox 27">
+            <a:extLst>
+              <a:ext uri="{FF2B5EF4-FFF2-40B4-BE49-F238E27FC236}">
+                <a16:creationId xmlns:a16="http://schemas.microsoft.com/office/drawing/2014/main" id="{98DD0DBF-AE61-472F-930F-2F8F30DA016C}"/>
+              </a:ext>
+            </a:extLst>
+          </p:cNvPr>
+          <p:cNvSpPr txBox="1"/>
+          <p:nvPr/>
+        </p:nvSpPr>
+        <p:spPr>
+          <a:xfrm>
+            <a:off x="7441252" y="3772113"/>
+            <a:ext cx="300862" cy="369332"/>
+          </a:xfrm>
+          <a:prstGeom prst="rect">
+            <a:avLst/>
+          </a:prstGeom>
+          <a:noFill/>
+        </p:spPr>
+        <p:txBody>
+          <a:bodyPr wrap="square" rtlCol="0">
+            <a:spAutoFit/>
+          </a:bodyPr>
+          <a:lstStyle/>
+          <a:p>
+            <a:r>
+              <a:rPr lang="en-US" dirty="0"/>
+              <a:t>C</a:t>
+            </a:r>
+          </a:p>
+        </p:txBody>
+      </p:sp>
+      <p:sp>
+        <p:nvSpPr>
+          <p:cNvPr id="29" name="TextBox 28">
+            <a:extLst>
+              <a:ext uri="{FF2B5EF4-FFF2-40B4-BE49-F238E27FC236}">
+                <a16:creationId xmlns:a16="http://schemas.microsoft.com/office/drawing/2014/main" id="{72973D0D-5E91-4763-8540-9CBE3B40AD7F}"/>
+              </a:ext>
+            </a:extLst>
+          </p:cNvPr>
+          <p:cNvSpPr txBox="1"/>
+          <p:nvPr/>
+        </p:nvSpPr>
+        <p:spPr>
+          <a:xfrm>
+            <a:off x="3708400" y="5363707"/>
+            <a:ext cx="1962150" cy="923330"/>
+          </a:xfrm>
+          <a:prstGeom prst="rect">
+            <a:avLst/>
+          </a:prstGeom>
+          <a:noFill/>
+        </p:spPr>
+        <p:txBody>
+          <a:bodyPr wrap="square" rtlCol="0">
+            <a:spAutoFit/>
+          </a:bodyPr>
+          <a:lstStyle/>
+          <a:p>
+            <a:r>
+              <a:rPr lang="en-US" dirty="0"/>
+              <a:t>Full formal ontology representation</a:t>
+            </a:r>
+          </a:p>
+        </p:txBody>
+      </p:sp>
+      <p:sp>
+        <p:nvSpPr>
+          <p:cNvPr id="30" name="TextBox 29">
+            <a:extLst>
+              <a:ext uri="{FF2B5EF4-FFF2-40B4-BE49-F238E27FC236}">
+                <a16:creationId xmlns:a16="http://schemas.microsoft.com/office/drawing/2014/main" id="{63A18C2A-0719-4BB0-974E-8E0FD42EBAA6}"/>
+              </a:ext>
+            </a:extLst>
+          </p:cNvPr>
+          <p:cNvSpPr txBox="1"/>
+          <p:nvPr/>
+        </p:nvSpPr>
+        <p:spPr>
+          <a:xfrm>
+            <a:off x="9724461" y="5363707"/>
+            <a:ext cx="1962150" cy="923330"/>
+          </a:xfrm>
+          <a:prstGeom prst="rect">
+            <a:avLst/>
+          </a:prstGeom>
+          <a:noFill/>
+        </p:spPr>
+        <p:txBody>
+          <a:bodyPr wrap="square" rtlCol="0">
+            <a:spAutoFit/>
+          </a:bodyPr>
+          <a:lstStyle/>
+          <a:p>
+            <a:r>
+              <a:rPr lang="en-US" dirty="0"/>
+              <a:t>Current shortcut ontology representation</a:t>
+            </a:r>
+          </a:p>
+        </p:txBody>
+      </p:sp>
+      <p:sp>
+        <p:nvSpPr>
+          <p:cNvPr id="31" name="TextBox 30">
+            <a:extLst>
+              <a:ext uri="{FF2B5EF4-FFF2-40B4-BE49-F238E27FC236}">
+                <a16:creationId xmlns:a16="http://schemas.microsoft.com/office/drawing/2014/main" id="{6AF3D9E4-ABAA-4658-B8A1-401D7B0CCC67}"/>
+              </a:ext>
+            </a:extLst>
+          </p:cNvPr>
+          <p:cNvSpPr txBox="1"/>
+          <p:nvPr/>
+        </p:nvSpPr>
+        <p:spPr>
+          <a:xfrm>
+            <a:off x="8484301" y="3629644"/>
+            <a:ext cx="1546104" cy="369332"/>
+          </a:xfrm>
+          <a:prstGeom prst="rect">
+            <a:avLst/>
+          </a:prstGeom>
+          <a:noFill/>
+        </p:spPr>
+        <p:txBody>
+          <a:bodyPr wrap="square" rtlCol="0">
+            <a:spAutoFit/>
+          </a:bodyPr>
+          <a:lstStyle/>
+          <a:p>
+            <a:pPr algn="ctr"/>
+            <a:r>
+              <a:rPr lang="en-US" dirty="0" err="1"/>
+              <a:t>isDerivedFrom</a:t>
+            </a:r>
+            <a:endParaRPr lang="en-US" dirty="0"/>
+          </a:p>
+        </p:txBody>
+      </p:sp>
+      <p:sp>
+        <p:nvSpPr>
+          <p:cNvPr id="17" name="Arrow: Left-Right 16">
+            <a:extLst>
+              <a:ext uri="{FF2B5EF4-FFF2-40B4-BE49-F238E27FC236}">
+                <a16:creationId xmlns:a16="http://schemas.microsoft.com/office/drawing/2014/main" id="{AE9D40AE-8D04-42E2-BEF7-5FF46E9D204D}"/>
+              </a:ext>
+            </a:extLst>
+          </p:cNvPr>
+          <p:cNvSpPr/>
+          <p:nvPr/>
+        </p:nvSpPr>
+        <p:spPr>
+          <a:xfrm>
+            <a:off x="2747140" y="3897263"/>
+            <a:ext cx="680090" cy="179126"/>
+          </a:xfrm>
+          <a:prstGeom prst="leftRightArrow">
+            <a:avLst/>
+          </a:prstGeom>
+        </p:spPr>
+        <p:style>
+          <a:lnRef idx="2">
+            <a:schemeClr val="accent1">
+              <a:shade val="50000"/>
+            </a:schemeClr>
+          </a:lnRef>
+          <a:fillRef idx="1">
+            <a:schemeClr val="accent1"/>
+          </a:fillRef>
+          <a:effectRef idx="0">
+            <a:schemeClr val="accent1"/>
+          </a:effectRef>
+          <a:fontRef idx="minor">
+            <a:schemeClr val="lt1"/>
+          </a:fontRef>
+        </p:style>
+        <p:txBody>
+          <a:bodyPr rtlCol="0" anchor="ctr"/>
+          <a:lstStyle/>
+          <a:p>
+            <a:pPr algn="ctr"/>
+            <a:endParaRPr lang="en-US" dirty="0"/>
+          </a:p>
+        </p:txBody>
+      </p:sp>
+      <p:cxnSp>
+        <p:nvCxnSpPr>
+          <p:cNvPr id="23" name="Connector: Curved 22">
+            <a:extLst>
+              <a:ext uri="{FF2B5EF4-FFF2-40B4-BE49-F238E27FC236}">
+                <a16:creationId xmlns:a16="http://schemas.microsoft.com/office/drawing/2014/main" id="{B4F9F733-5DF1-42BD-84A2-D33238253322}"/>
+              </a:ext>
+            </a:extLst>
+          </p:cNvPr>
+          <p:cNvCxnSpPr>
+            <a:endCxn id="17" idx="1"/>
+          </p:cNvCxnSpPr>
+          <p:nvPr/>
+        </p:nvCxnSpPr>
+        <p:spPr>
+          <a:xfrm rot="5400000">
+            <a:off x="2922025" y="2700558"/>
+            <a:ext cx="1406647" cy="1076326"/>
+          </a:xfrm>
+          <a:prstGeom prst="curvedConnector3">
+            <a:avLst/>
+          </a:prstGeom>
+          <a:ln>
+            <a:tailEnd type="triangle"/>
+          </a:ln>
+        </p:spPr>
+        <p:style>
+          <a:lnRef idx="1">
+            <a:schemeClr val="accent1"/>
+          </a:lnRef>
+          <a:fillRef idx="0">
+            <a:schemeClr val="accent1"/>
+          </a:fillRef>
+          <a:effectRef idx="0">
+            <a:schemeClr val="accent1"/>
+          </a:effectRef>
+          <a:fontRef idx="minor">
+            <a:schemeClr val="tx1"/>
+          </a:fontRef>
+        </p:style>
+      </p:cxnSp>
+      <p:sp>
+        <p:nvSpPr>
+          <p:cNvPr id="32" name="TextBox 31">
+            <a:extLst>
+              <a:ext uri="{FF2B5EF4-FFF2-40B4-BE49-F238E27FC236}">
+                <a16:creationId xmlns:a16="http://schemas.microsoft.com/office/drawing/2014/main" id="{8557DA2E-7CDF-436B-965B-4D20C4144276}"/>
+              </a:ext>
+            </a:extLst>
+          </p:cNvPr>
+          <p:cNvSpPr txBox="1"/>
+          <p:nvPr/>
+        </p:nvSpPr>
+        <p:spPr>
+          <a:xfrm>
+            <a:off x="3778654" y="2144454"/>
+            <a:ext cx="1962150" cy="369332"/>
+          </a:xfrm>
+          <a:prstGeom prst="rect">
+            <a:avLst/>
+          </a:prstGeom>
+          <a:noFill/>
+        </p:spPr>
+        <p:txBody>
+          <a:bodyPr wrap="square" rtlCol="0">
+            <a:spAutoFit/>
+          </a:bodyPr>
+          <a:lstStyle/>
+          <a:p>
+            <a:r>
+              <a:rPr lang="en-US" dirty="0"/>
+              <a:t>Same IRI</a:t>
+            </a:r>
+          </a:p>
+        </p:txBody>
+      </p:sp>
+    </p:spTree>
+    <p:extLst>
+      <p:ext uri="{BB962C8B-B14F-4D97-AF65-F5344CB8AC3E}">
+        <p14:creationId xmlns:p14="http://schemas.microsoft.com/office/powerpoint/2010/main" val="1287982335"/>
+      </p:ext>
+    </p:extLst>
+  </p:cSld>
+  <p:clrMapOvr>
+    <a:masterClrMapping/>
+  </p:clrMapOvr>
+</p:sld>
+</file>
+
 <file path=ppt/theme/theme1.xml><?xml version="1.0" encoding="utf-8"?>
 <a:theme xmlns:a="http://schemas.openxmlformats.org/drawingml/2006/main" name="Office Theme">
   <a:themeElements>

</xml_diff>